<commit_message>
CoulombsLaw between the mass points
</commit_message>
<xml_diff>
--- a/gr/physics/Figures.pptx
+++ b/gr/physics/Figures.pptx
@@ -6,6 +6,7 @@
   </p:sldMasterIdLst>
   <p:sldIdLst>
     <p:sldId id="256" r:id="rId2"/>
+    <p:sldId id="257" r:id="rId3"/>
   </p:sldIdLst>
   <p:sldSz cx="12192000" cy="6858000"/>
   <p:notesSz cx="6858000" cy="9144000"/>
@@ -104,7 +105,38 @@
       </a:defRPr>
     </a:lvl9pPr>
   </p:defaultTextStyle>
+  <p:extLst>
+    <p:ext uri="{EFAFB233-063F-42B5-8137-9DF3F51BA10A}">
+      <p15:sldGuideLst xmlns:p15="http://schemas.microsoft.com/office/powerpoint/2012/main"/>
+    </p:ext>
+  </p:extLst>
 </p:presentation>
+</file>
+
+<file path=ppt/commentAuthors.xml><?xml version="1.0" encoding="utf-8"?>
+<p:cmAuthorLst xmlns:a="http://schemas.openxmlformats.org/drawingml/2006/main" xmlns:r="http://schemas.openxmlformats.org/officeDocument/2006/relationships" xmlns:p="http://schemas.openxmlformats.org/presentationml/2006/main">
+  <p:cmAuthor id="1" name="xie guigang" initials="xg" lastIdx="1" clrIdx="0">
+    <p:extLst>
+      <p:ext uri="{19B8F6BF-5375-455C-9EA6-DF929625EA0E}">
+        <p15:presenceInfo xmlns:p15="http://schemas.microsoft.com/office/powerpoint/2012/main" userId="ae9b61088bbb7c3f" providerId="Windows Live"/>
+      </p:ext>
+    </p:extLst>
+  </p:cmAuthor>
+</p:cmAuthorLst>
+</file>
+
+<file path=ppt/comments/comment1.xml><?xml version="1.0" encoding="utf-8"?>
+<p:cmLst xmlns:a="http://schemas.openxmlformats.org/drawingml/2006/main" xmlns:r="http://schemas.openxmlformats.org/officeDocument/2006/relationships" xmlns:p="http://schemas.openxmlformats.org/presentationml/2006/main">
+  <p:cm authorId="1" dt="2017-07-08T11:35:49.961" idx="1">
+    <p:pos x="10" y="10"/>
+    <p:text/>
+    <p:extLst>
+      <p:ext uri="{C676402C-5697-4E1C-873F-D02D1690AC5C}">
+        <p15:threadingInfo xmlns:p15="http://schemas.microsoft.com/office/powerpoint/2012/main" timeZoneBias="-480"/>
+      </p:ext>
+    </p:extLst>
+  </p:cm>
+</p:cmLst>
 </file>
 
 <file path=ppt/slideLayouts/slideLayout1.xml><?xml version="1.0" encoding="utf-8"?>
@@ -2972,7 +3004,7 @@
         </p:nvGrpSpPr>
         <p:grpSpPr>
           <a:xfrm>
-            <a:off x="99742" y="418750"/>
+            <a:off x="286101" y="1238960"/>
             <a:ext cx="11905899" cy="5524668"/>
             <a:chOff x="237889" y="418750"/>
             <a:chExt cx="11905899" cy="5524668"/>
@@ -3167,8 +3199,8 @@
             </a:fontRef>
           </p:style>
         </p:cxnSp>
-        <mc:AlternateContent xmlns:mc="http://schemas.openxmlformats.org/markup-compatibility/2006">
-          <mc:Choice xmlns:a14="http://schemas.microsoft.com/office/drawing/2010/main" Requires="a14">
+        <mc:AlternateContent xmlns:mc="http://schemas.openxmlformats.org/markup-compatibility/2006" xmlns:a14="http://schemas.microsoft.com/office/drawing/2010/main">
+          <mc:Choice Requires="a14">
             <p:sp>
               <p:nvSpPr>
                 <p:cNvPr id="20" name="TextBox 19"/>
@@ -3191,6 +3223,7 @@
                 </a:bodyPr>
                 <a:lstStyle/>
                 <a:p>
+                  <a:pPr/>
                   <a14:m>
                     <m:oMathPara xmlns:m="http://schemas.openxmlformats.org/officeDocument/2006/math">
                       <m:oMathParaPr>
@@ -3372,7 +3405,7 @@
               </p:txBody>
             </p:sp>
           </mc:Choice>
-          <mc:Fallback>
+          <mc:Fallback xmlns="">
             <p:sp>
               <p:nvSpPr>
                 <p:cNvPr id="20" name="TextBox 19"/>
@@ -3568,8 +3601,8 @@
             </a:p>
           </p:txBody>
         </p:sp>
-        <mc:AlternateContent xmlns:mc="http://schemas.openxmlformats.org/markup-compatibility/2006">
-          <mc:Choice xmlns:a14="http://schemas.microsoft.com/office/drawing/2010/main" Requires="a14">
+        <mc:AlternateContent xmlns:mc="http://schemas.openxmlformats.org/markup-compatibility/2006" xmlns:a14="http://schemas.microsoft.com/office/drawing/2010/main">
+          <mc:Choice Requires="a14">
             <p:sp>
               <p:nvSpPr>
                 <p:cNvPr id="28" name="TextBox 27"/>
@@ -3592,6 +3625,7 @@
                 </a:bodyPr>
                 <a:lstStyle/>
                 <a:p>
+                  <a:pPr/>
                   <a14:m>
                     <m:oMathPara xmlns:m="http://schemas.openxmlformats.org/officeDocument/2006/math">
                       <m:oMathParaPr>
@@ -3701,7 +3735,7 @@
               </p:txBody>
             </p:sp>
           </mc:Choice>
-          <mc:Fallback>
+          <mc:Fallback xmlns="">
             <p:sp>
               <p:nvSpPr>
                 <p:cNvPr id="28" name="TextBox 27"/>
@@ -3803,8 +3837,8 @@
             </a:p>
           </p:txBody>
         </p:sp>
-        <mc:AlternateContent xmlns:mc="http://schemas.openxmlformats.org/markup-compatibility/2006">
-          <mc:Choice xmlns:a14="http://schemas.microsoft.com/office/drawing/2010/main" Requires="a14">
+        <mc:AlternateContent xmlns:mc="http://schemas.openxmlformats.org/markup-compatibility/2006" xmlns:a14="http://schemas.microsoft.com/office/drawing/2010/main">
+          <mc:Choice Requires="a14">
             <p:sp>
               <p:nvSpPr>
                 <p:cNvPr id="32" name="TextBox 31"/>
@@ -3827,6 +3861,7 @@
                 </a:bodyPr>
                 <a:lstStyle/>
                 <a:p>
+                  <a:pPr/>
                   <a14:m>
                     <m:oMathPara xmlns:m="http://schemas.openxmlformats.org/officeDocument/2006/math">
                       <m:oMathParaPr>
@@ -3969,7 +4004,7 @@
               </p:txBody>
             </p:sp>
           </mc:Choice>
-          <mc:Fallback>
+          <mc:Fallback xmlns="">
             <p:sp>
               <p:nvSpPr>
                 <p:cNvPr id="32" name="TextBox 31"/>
@@ -4009,10 +4044,774 @@
           </mc:Fallback>
         </mc:AlternateContent>
       </p:grpSp>
+      <p:sp>
+        <p:nvSpPr>
+          <p:cNvPr id="2" name="Title 1"/>
+          <p:cNvSpPr>
+            <a:spLocks noGrp="1"/>
+          </p:cNvSpPr>
+          <p:nvPr>
+            <p:ph type="title"/>
+          </p:nvPr>
+        </p:nvSpPr>
+        <p:spPr>
+          <a:xfrm>
+            <a:off x="286101" y="125282"/>
+            <a:ext cx="10515600" cy="929014"/>
+          </a:xfrm>
+        </p:spPr>
+        <p:txBody>
+          <a:bodyPr/>
+          <a:lstStyle/>
+          <a:p>
+            <a:r>
+              <a:rPr lang="en-US" dirty="0" smtClean="0"/>
+              <a:t>Parallelogram Law</a:t>
+            </a:r>
+            <a:endParaRPr lang="en-US" dirty="0"/>
+          </a:p>
+        </p:txBody>
+      </p:sp>
+      <p:sp>
+        <p:nvSpPr>
+          <p:cNvPr id="3" name="Content Placeholder 2"/>
+          <p:cNvSpPr>
+            <a:spLocks noGrp="1"/>
+          </p:cNvSpPr>
+          <p:nvPr>
+            <p:ph idx="1"/>
+          </p:nvPr>
+        </p:nvSpPr>
+        <p:spPr/>
+        <p:txBody>
+          <a:bodyPr/>
+          <a:lstStyle/>
+          <a:p>
+            <a:endParaRPr lang="en-US"/>
+          </a:p>
+        </p:txBody>
+      </p:sp>
     </p:spTree>
     <p:extLst>
       <p:ext uri="{BB962C8B-B14F-4D97-AF65-F5344CB8AC3E}">
         <p14:creationId xmlns:p14="http://schemas.microsoft.com/office/powerpoint/2010/main" val="204605165"/>
+      </p:ext>
+    </p:extLst>
+  </p:cSld>
+  <p:clrMapOvr>
+    <a:masterClrMapping/>
+  </p:clrMapOvr>
+</p:sld>
+</file>
+
+<file path=ppt/slides/slide2.xml><?xml version="1.0" encoding="utf-8"?>
+<p:sld xmlns:a="http://schemas.openxmlformats.org/drawingml/2006/main" xmlns:r="http://schemas.openxmlformats.org/officeDocument/2006/relationships" xmlns:p="http://schemas.openxmlformats.org/presentationml/2006/main">
+  <p:cSld>
+    <p:spTree>
+      <p:nvGrpSpPr>
+        <p:cNvPr id="1" name=""/>
+        <p:cNvGrpSpPr/>
+        <p:nvPr/>
+      </p:nvGrpSpPr>
+      <p:grpSpPr>
+        <a:xfrm>
+          <a:off x="0" y="0"/>
+          <a:ext cx="0" cy="0"/>
+          <a:chOff x="0" y="0"/>
+          <a:chExt cx="0" cy="0"/>
+        </a:xfrm>
+      </p:grpSpPr>
+      <p:sp>
+        <p:nvSpPr>
+          <p:cNvPr id="2" name="Title 1"/>
+          <p:cNvSpPr>
+            <a:spLocks noGrp="1"/>
+          </p:cNvSpPr>
+          <p:nvPr>
+            <p:ph type="title"/>
+          </p:nvPr>
+        </p:nvSpPr>
+        <p:spPr/>
+        <p:txBody>
+          <a:bodyPr/>
+          <a:lstStyle/>
+          <a:p>
+            <a:r>
+              <a:rPr lang="en-US" dirty="0" smtClean="0"/>
+              <a:t>Coulombs Law</a:t>
+            </a:r>
+            <a:endParaRPr lang="en-US" dirty="0"/>
+          </a:p>
+        </p:txBody>
+      </p:sp>
+      <p:cxnSp>
+        <p:nvCxnSpPr>
+          <p:cNvPr id="8" name="Straight Connector 7"/>
+          <p:cNvCxnSpPr/>
+          <p:nvPr/>
+        </p:nvCxnSpPr>
+        <p:spPr>
+          <a:xfrm flipH="1">
+            <a:off x="3999550" y="2001032"/>
+            <a:ext cx="2937799" cy="2071087"/>
+          </a:xfrm>
+          <a:prstGeom prst="line">
+            <a:avLst/>
+          </a:prstGeom>
+          <a:ln w="63500">
+            <a:solidFill>
+              <a:schemeClr val="tx1"/>
+            </a:solidFill>
+            <a:prstDash val="dash"/>
+          </a:ln>
+        </p:spPr>
+        <p:style>
+          <a:lnRef idx="1">
+            <a:schemeClr val="accent1"/>
+          </a:lnRef>
+          <a:fillRef idx="0">
+            <a:schemeClr val="accent1"/>
+          </a:fillRef>
+          <a:effectRef idx="0">
+            <a:schemeClr val="accent1"/>
+          </a:effectRef>
+          <a:fontRef idx="minor">
+            <a:schemeClr val="tx1"/>
+          </a:fontRef>
+        </p:style>
+      </p:cxnSp>
+      <p:sp>
+        <p:nvSpPr>
+          <p:cNvPr id="6" name="Oval 5"/>
+          <p:cNvSpPr/>
+          <p:nvPr/>
+        </p:nvSpPr>
+        <p:spPr>
+          <a:xfrm>
+            <a:off x="3864671" y="3857693"/>
+            <a:ext cx="352168" cy="352168"/>
+          </a:xfrm>
+          <a:prstGeom prst="ellipse">
+            <a:avLst/>
+          </a:prstGeom>
+        </p:spPr>
+        <p:style>
+          <a:lnRef idx="0">
+            <a:schemeClr val="accent5"/>
+          </a:lnRef>
+          <a:fillRef idx="3">
+            <a:schemeClr val="accent5"/>
+          </a:fillRef>
+          <a:effectRef idx="3">
+            <a:schemeClr val="accent5"/>
+          </a:effectRef>
+          <a:fontRef idx="minor">
+            <a:schemeClr val="lt1"/>
+          </a:fontRef>
+        </p:style>
+        <p:txBody>
+          <a:bodyPr rtlCol="0" anchor="ctr"/>
+          <a:lstStyle/>
+          <a:p>
+            <a:pPr algn="ctr"/>
+            <a:endParaRPr lang="en-US"/>
+          </a:p>
+        </p:txBody>
+      </p:sp>
+      <p:sp>
+        <p:nvSpPr>
+          <p:cNvPr id="4" name="Oval 3"/>
+          <p:cNvSpPr/>
+          <p:nvPr/>
+        </p:nvSpPr>
+        <p:spPr>
+          <a:xfrm>
+            <a:off x="6761265" y="1818319"/>
+            <a:ext cx="352168" cy="352168"/>
+          </a:xfrm>
+          <a:prstGeom prst="ellipse">
+            <a:avLst/>
+          </a:prstGeom>
+        </p:spPr>
+        <p:style>
+          <a:lnRef idx="0">
+            <a:schemeClr val="accent5"/>
+          </a:lnRef>
+          <a:fillRef idx="3">
+            <a:schemeClr val="accent5"/>
+          </a:fillRef>
+          <a:effectRef idx="3">
+            <a:schemeClr val="accent5"/>
+          </a:effectRef>
+          <a:fontRef idx="minor">
+            <a:schemeClr val="lt1"/>
+          </a:fontRef>
+        </p:style>
+        <p:txBody>
+          <a:bodyPr rtlCol="0" anchor="ctr"/>
+          <a:lstStyle/>
+          <a:p>
+            <a:pPr algn="ctr"/>
+            <a:endParaRPr lang="en-US"/>
+          </a:p>
+        </p:txBody>
+      </p:sp>
+      <p:cxnSp>
+        <p:nvCxnSpPr>
+          <p:cNvPr id="11" name="Straight Arrow Connector 10"/>
+          <p:cNvCxnSpPr/>
+          <p:nvPr/>
+        </p:nvCxnSpPr>
+        <p:spPr>
+          <a:xfrm flipH="1">
+            <a:off x="2039309" y="4033777"/>
+            <a:ext cx="2001446" cy="1328841"/>
+          </a:xfrm>
+          <a:prstGeom prst="straightConnector1">
+            <a:avLst/>
+          </a:prstGeom>
+          <a:ln w="63500">
+            <a:solidFill>
+              <a:srgbClr val="92D050"/>
+            </a:solidFill>
+            <a:tailEnd type="triangle"/>
+          </a:ln>
+        </p:spPr>
+        <p:style>
+          <a:lnRef idx="1">
+            <a:schemeClr val="accent1"/>
+          </a:lnRef>
+          <a:fillRef idx="0">
+            <a:schemeClr val="accent1"/>
+          </a:fillRef>
+          <a:effectRef idx="0">
+            <a:schemeClr val="accent1"/>
+          </a:effectRef>
+          <a:fontRef idx="minor">
+            <a:schemeClr val="tx1"/>
+          </a:fontRef>
+        </p:style>
+      </p:cxnSp>
+      <mc:AlternateContent xmlns:mc="http://schemas.openxmlformats.org/markup-compatibility/2006">
+        <mc:Choice xmlns:a14="http://schemas.microsoft.com/office/drawing/2010/main" Requires="a14">
+          <p:sp>
+            <p:nvSpPr>
+              <p:cNvPr id="13" name="TextBox 12"/>
+              <p:cNvSpPr txBox="1"/>
+              <p:nvPr/>
+            </p:nvSpPr>
+            <p:spPr>
+              <a:xfrm>
+                <a:off x="2086249" y="4033776"/>
+                <a:ext cx="1367426" cy="627801"/>
+              </a:xfrm>
+              <a:prstGeom prst="rect">
+                <a:avLst/>
+              </a:prstGeom>
+              <a:noFill/>
+            </p:spPr>
+            <p:txBody>
+              <a:bodyPr wrap="none" rtlCol="0">
+                <a:spAutoFit/>
+              </a:bodyPr>
+              <a:lstStyle/>
+              <a:p>
+                <a14:m>
+                  <m:oMathPara xmlns:m="http://schemas.openxmlformats.org/officeDocument/2006/math">
+                    <m:oMathParaPr>
+                      <m:jc m:val="centerGroup"/>
+                    </m:oMathParaPr>
+                    <m:oMath xmlns:m="http://schemas.openxmlformats.org/officeDocument/2006/math">
+                      <m:r>
+                        <a:rPr lang="en-US" b="0" i="1" smtClean="0">
+                          <a:latin typeface="Cambria Math" panose="02040503050406030204" pitchFamily="18" charset="0"/>
+                        </a:rPr>
+                        <m:t>𝐹</m:t>
+                      </m:r>
+                      <m:r>
+                        <a:rPr lang="en-US" b="0" i="1" smtClean="0">
+                          <a:latin typeface="Cambria Math" panose="02040503050406030204" pitchFamily="18" charset="0"/>
+                        </a:rPr>
+                        <m:t>=</m:t>
+                      </m:r>
+                      <m:r>
+                        <a:rPr lang="en-US" b="0" i="1" smtClean="0">
+                          <a:latin typeface="Cambria Math" panose="02040503050406030204" pitchFamily="18" charset="0"/>
+                        </a:rPr>
+                        <m:t>𝑘</m:t>
+                      </m:r>
+                      <m:f>
+                        <m:fPr>
+                          <m:ctrlPr>
+                            <a:rPr lang="en-US" b="0" i="1" smtClean="0">
+                              <a:latin typeface="Cambria Math" panose="02040503050406030204" pitchFamily="18" charset="0"/>
+                            </a:rPr>
+                          </m:ctrlPr>
+                        </m:fPr>
+                        <m:num>
+                          <m:r>
+                            <a:rPr lang="en-US" b="0" i="1" smtClean="0">
+                              <a:latin typeface="Cambria Math" panose="02040503050406030204" pitchFamily="18" charset="0"/>
+                            </a:rPr>
+                            <m:t>𝑞</m:t>
+                          </m:r>
+                          <m:r>
+                            <a:rPr lang="en-US" b="0" i="1" smtClean="0">
+                              <a:latin typeface="Cambria Math" panose="02040503050406030204" pitchFamily="18" charset="0"/>
+                            </a:rPr>
+                            <m:t>1</m:t>
+                          </m:r>
+                          <m:r>
+                            <a:rPr lang="en-US" b="0" i="1" smtClean="0">
+                              <a:latin typeface="Cambria Math" panose="02040503050406030204" pitchFamily="18" charset="0"/>
+                            </a:rPr>
+                            <m:t>𝑞</m:t>
+                          </m:r>
+                          <m:r>
+                            <a:rPr lang="en-US" b="0" i="1" smtClean="0">
+                              <a:latin typeface="Cambria Math" panose="02040503050406030204" pitchFamily="18" charset="0"/>
+                            </a:rPr>
+                            <m:t>2</m:t>
+                          </m:r>
+                        </m:num>
+                        <m:den>
+                          <m:sSup>
+                            <m:sSupPr>
+                              <m:ctrlPr>
+                                <a:rPr lang="en-US" b="0" i="1" smtClean="0">
+                                  <a:latin typeface="Cambria Math" panose="02040503050406030204" pitchFamily="18" charset="0"/>
+                                </a:rPr>
+                              </m:ctrlPr>
+                            </m:sSupPr>
+                            <m:e>
+                              <m:r>
+                                <a:rPr lang="en-US" b="0" i="1" smtClean="0">
+                                  <a:latin typeface="Cambria Math" panose="02040503050406030204" pitchFamily="18" charset="0"/>
+                                </a:rPr>
+                                <m:t>𝑟</m:t>
+                              </m:r>
+                            </m:e>
+                            <m:sup>
+                              <m:r>
+                                <a:rPr lang="en-US" b="0" i="1" smtClean="0">
+                                  <a:latin typeface="Cambria Math" panose="02040503050406030204" pitchFamily="18" charset="0"/>
+                                </a:rPr>
+                                <m:t>2</m:t>
+                              </m:r>
+                            </m:sup>
+                          </m:sSup>
+                        </m:den>
+                      </m:f>
+                    </m:oMath>
+                  </m:oMathPara>
+                </a14:m>
+                <a:endParaRPr lang="en-US" dirty="0"/>
+              </a:p>
+            </p:txBody>
+          </p:sp>
+        </mc:Choice>
+        <mc:Fallback>
+          <p:sp>
+            <p:nvSpPr>
+              <p:cNvPr id="13" name="TextBox 12"/>
+              <p:cNvSpPr txBox="1">
+                <a:spLocks noRot="1" noChangeAspect="1" noMove="1" noResize="1" noEditPoints="1" noAdjustHandles="1" noChangeArrowheads="1" noChangeShapeType="1" noTextEdit="1"/>
+              </p:cNvSpPr>
+              <p:nvPr/>
+            </p:nvSpPr>
+            <p:spPr>
+              <a:xfrm>
+                <a:off x="2086249" y="4033776"/>
+                <a:ext cx="1367426" cy="627801"/>
+              </a:xfrm>
+              <a:prstGeom prst="rect">
+                <a:avLst/>
+              </a:prstGeom>
+              <a:blipFill>
+                <a:blip r:embed="rId2"/>
+                <a:stretch>
+                  <a:fillRect/>
+                </a:stretch>
+              </a:blipFill>
+            </p:spPr>
+            <p:txBody>
+              <a:bodyPr/>
+              <a:lstStyle/>
+              <a:p>
+                <a:r>
+                  <a:rPr lang="en-US">
+                    <a:noFill/>
+                  </a:rPr>
+                  <a:t> </a:t>
+                </a:r>
+              </a:p>
+            </p:txBody>
+          </p:sp>
+        </mc:Fallback>
+      </mc:AlternateContent>
+      <p:cxnSp>
+        <p:nvCxnSpPr>
+          <p:cNvPr id="15" name="Straight Arrow Connector 14"/>
+          <p:cNvCxnSpPr/>
+          <p:nvPr/>
+        </p:nvCxnSpPr>
+        <p:spPr>
+          <a:xfrm>
+            <a:off x="894665" y="5362618"/>
+            <a:ext cx="9657116" cy="0"/>
+          </a:xfrm>
+          <a:prstGeom prst="straightConnector1">
+            <a:avLst/>
+          </a:prstGeom>
+          <a:ln>
+            <a:tailEnd type="triangle"/>
+          </a:ln>
+        </p:spPr>
+        <p:style>
+          <a:lnRef idx="1">
+            <a:schemeClr val="accent1"/>
+          </a:lnRef>
+          <a:fillRef idx="0">
+            <a:schemeClr val="accent1"/>
+          </a:fillRef>
+          <a:effectRef idx="0">
+            <a:schemeClr val="accent1"/>
+          </a:effectRef>
+          <a:fontRef idx="minor">
+            <a:schemeClr val="tx1"/>
+          </a:fontRef>
+        </p:style>
+      </p:cxnSp>
+      <p:cxnSp>
+        <p:nvCxnSpPr>
+          <p:cNvPr id="19" name="Straight Arrow Connector 18"/>
+          <p:cNvCxnSpPr/>
+          <p:nvPr/>
+        </p:nvCxnSpPr>
+        <p:spPr>
+          <a:xfrm flipH="1" flipV="1">
+            <a:off x="2909267" y="4864192"/>
+            <a:ext cx="130765" cy="451169"/>
+          </a:xfrm>
+          <a:prstGeom prst="straightConnector1">
+            <a:avLst/>
+          </a:prstGeom>
+          <a:ln>
+            <a:tailEnd type="triangle"/>
+          </a:ln>
+        </p:spPr>
+        <p:style>
+          <a:lnRef idx="1">
+            <a:schemeClr val="accent1"/>
+          </a:lnRef>
+          <a:fillRef idx="0">
+            <a:schemeClr val="accent1"/>
+          </a:fillRef>
+          <a:effectRef idx="0">
+            <a:schemeClr val="accent1"/>
+          </a:effectRef>
+          <a:fontRef idx="minor">
+            <a:schemeClr val="tx1"/>
+          </a:fontRef>
+        </p:style>
+      </p:cxnSp>
+      <p:sp>
+        <p:nvSpPr>
+          <p:cNvPr id="20" name="TextBox 19"/>
+          <p:cNvSpPr txBox="1"/>
+          <p:nvPr/>
+        </p:nvSpPr>
+        <p:spPr>
+          <a:xfrm>
+            <a:off x="2974649" y="4864191"/>
+            <a:ext cx="295274" cy="369332"/>
+          </a:xfrm>
+          <a:prstGeom prst="rect">
+            <a:avLst/>
+          </a:prstGeom>
+          <a:noFill/>
+        </p:spPr>
+        <p:txBody>
+          <a:bodyPr wrap="none" rtlCol="0">
+            <a:spAutoFit/>
+          </a:bodyPr>
+          <a:lstStyle/>
+          <a:p>
+            <a:r>
+              <a:rPr lang="en-US" dirty="0" smtClean="0"/>
+              <a:t>a</a:t>
+            </a:r>
+            <a:endParaRPr lang="en-US" dirty="0"/>
+          </a:p>
+        </p:txBody>
+      </p:sp>
+      <p:cxnSp>
+        <p:nvCxnSpPr>
+          <p:cNvPr id="24" name="Straight Arrow Connector 23"/>
+          <p:cNvCxnSpPr/>
+          <p:nvPr/>
+        </p:nvCxnSpPr>
+        <p:spPr>
+          <a:xfrm flipH="1" flipV="1">
+            <a:off x="2046980" y="1940668"/>
+            <a:ext cx="6578" cy="4335142"/>
+          </a:xfrm>
+          <a:prstGeom prst="straightConnector1">
+            <a:avLst/>
+          </a:prstGeom>
+          <a:ln>
+            <a:tailEnd type="triangle"/>
+          </a:ln>
+        </p:spPr>
+        <p:style>
+          <a:lnRef idx="1">
+            <a:schemeClr val="accent1"/>
+          </a:lnRef>
+          <a:fillRef idx="0">
+            <a:schemeClr val="accent1"/>
+          </a:fillRef>
+          <a:effectRef idx="0">
+            <a:schemeClr val="accent1"/>
+          </a:effectRef>
+          <a:fontRef idx="minor">
+            <a:schemeClr val="tx1"/>
+          </a:fontRef>
+        </p:style>
+      </p:cxnSp>
+      <mc:AlternateContent xmlns:mc="http://schemas.openxmlformats.org/markup-compatibility/2006">
+        <mc:Choice xmlns:a14="http://schemas.microsoft.com/office/drawing/2010/main" Requires="a14">
+          <p:sp>
+            <p:nvSpPr>
+              <p:cNvPr id="27" name="TextBox 26"/>
+              <p:cNvSpPr txBox="1"/>
+              <p:nvPr/>
+            </p:nvSpPr>
+            <p:spPr>
+              <a:xfrm>
+                <a:off x="3665157" y="5970050"/>
+                <a:ext cx="2156424" cy="669094"/>
+              </a:xfrm>
+              <a:prstGeom prst="rect">
+                <a:avLst/>
+              </a:prstGeom>
+              <a:noFill/>
+            </p:spPr>
+            <p:txBody>
+              <a:bodyPr wrap="none" rtlCol="0">
+                <a:spAutoFit/>
+              </a:bodyPr>
+              <a:lstStyle/>
+              <a:p>
+                <a14:m>
+                  <m:oMathPara xmlns:m="http://schemas.openxmlformats.org/officeDocument/2006/math">
+                    <m:oMathParaPr>
+                      <m:jc m:val="centerGroup"/>
+                    </m:oMathParaPr>
+                    <m:oMath xmlns:m="http://schemas.openxmlformats.org/officeDocument/2006/math">
+                      <m:func>
+                        <m:funcPr>
+                          <m:ctrlPr>
+                            <a:rPr lang="en-US" i="1" smtClean="0">
+                              <a:latin typeface="Cambria Math" panose="02040503050406030204" pitchFamily="18" charset="0"/>
+                            </a:rPr>
+                          </m:ctrlPr>
+                        </m:funcPr>
+                        <m:fName>
+                          <m:r>
+                            <m:rPr>
+                              <m:sty m:val="p"/>
+                            </m:rPr>
+                            <a:rPr lang="en-US" i="0" smtClean="0">
+                              <a:latin typeface="Cambria Math" panose="02040503050406030204" pitchFamily="18" charset="0"/>
+                            </a:rPr>
+                            <m:t>tan</m:t>
+                          </m:r>
+                        </m:fName>
+                        <m:e>
+                          <m:r>
+                            <a:rPr lang="en-US" b="0" i="1" smtClean="0">
+                              <a:latin typeface="Cambria Math" panose="02040503050406030204" pitchFamily="18" charset="0"/>
+                            </a:rPr>
+                            <m:t>𝑎</m:t>
+                          </m:r>
+                        </m:e>
+                      </m:func>
+                      <m:r>
+                        <a:rPr lang="en-US" b="0" i="1" smtClean="0">
+                          <a:latin typeface="Cambria Math" panose="02040503050406030204" pitchFamily="18" charset="0"/>
+                        </a:rPr>
+                        <m:t>=</m:t>
+                      </m:r>
+                      <m:f>
+                        <m:fPr>
+                          <m:ctrlPr>
+                            <a:rPr lang="en-US" b="0" i="1" smtClean="0">
+                              <a:latin typeface="Cambria Math" panose="02040503050406030204" pitchFamily="18" charset="0"/>
+                            </a:rPr>
+                          </m:ctrlPr>
+                        </m:fPr>
+                        <m:num>
+                          <m:r>
+                            <a:rPr lang="en-US" b="0" i="1" smtClean="0">
+                              <a:latin typeface="Cambria Math" panose="02040503050406030204" pitchFamily="18" charset="0"/>
+                            </a:rPr>
+                            <m:t>𝑌</m:t>
+                          </m:r>
+                          <m:r>
+                            <a:rPr lang="en-US" b="0" i="1" smtClean="0">
+                              <a:latin typeface="Cambria Math" panose="02040503050406030204" pitchFamily="18" charset="0"/>
+                            </a:rPr>
+                            <m:t>(</m:t>
+                          </m:r>
+                          <m:r>
+                            <a:rPr lang="en-US" b="0" i="1" smtClean="0">
+                              <a:latin typeface="Cambria Math" panose="02040503050406030204" pitchFamily="18" charset="0"/>
+                            </a:rPr>
+                            <m:t>𝑝</m:t>
+                          </m:r>
+                          <m:r>
+                            <a:rPr lang="en-US" b="0" i="1" smtClean="0">
+                              <a:latin typeface="Cambria Math" panose="02040503050406030204" pitchFamily="18" charset="0"/>
+                            </a:rPr>
+                            <m:t>1−</m:t>
+                          </m:r>
+                          <m:r>
+                            <a:rPr lang="en-US" b="0" i="1" smtClean="0">
+                              <a:latin typeface="Cambria Math" panose="02040503050406030204" pitchFamily="18" charset="0"/>
+                            </a:rPr>
+                            <m:t>𝑝</m:t>
+                          </m:r>
+                          <m:r>
+                            <a:rPr lang="en-US" b="0" i="1" smtClean="0">
+                              <a:latin typeface="Cambria Math" panose="02040503050406030204" pitchFamily="18" charset="0"/>
+                            </a:rPr>
+                            <m:t>2)</m:t>
+                          </m:r>
+                        </m:num>
+                        <m:den>
+                          <m:r>
+                            <a:rPr lang="en-US" b="0" i="1" smtClean="0">
+                              <a:latin typeface="Cambria Math" panose="02040503050406030204" pitchFamily="18" charset="0"/>
+                            </a:rPr>
+                            <m:t>𝑋</m:t>
+                          </m:r>
+                          <m:r>
+                            <a:rPr lang="en-US" b="0" i="1" smtClean="0">
+                              <a:latin typeface="Cambria Math" panose="02040503050406030204" pitchFamily="18" charset="0"/>
+                            </a:rPr>
+                            <m:t>(</m:t>
+                          </m:r>
+                          <m:r>
+                            <a:rPr lang="en-US" b="0" i="1" smtClean="0">
+                              <a:latin typeface="Cambria Math" panose="02040503050406030204" pitchFamily="18" charset="0"/>
+                            </a:rPr>
+                            <m:t>𝑝</m:t>
+                          </m:r>
+                          <m:r>
+                            <a:rPr lang="en-US" b="0" i="1" smtClean="0">
+                              <a:latin typeface="Cambria Math" panose="02040503050406030204" pitchFamily="18" charset="0"/>
+                            </a:rPr>
+                            <m:t>1−</m:t>
+                          </m:r>
+                          <m:r>
+                            <a:rPr lang="en-US" b="0" i="1" smtClean="0">
+                              <a:latin typeface="Cambria Math" panose="02040503050406030204" pitchFamily="18" charset="0"/>
+                            </a:rPr>
+                            <m:t>𝑝</m:t>
+                          </m:r>
+                          <m:r>
+                            <a:rPr lang="en-US" b="0" i="1" smtClean="0">
+                              <a:latin typeface="Cambria Math" panose="02040503050406030204" pitchFamily="18" charset="0"/>
+                            </a:rPr>
+                            <m:t>2)</m:t>
+                          </m:r>
+                        </m:den>
+                      </m:f>
+                    </m:oMath>
+                  </m:oMathPara>
+                </a14:m>
+                <a:endParaRPr lang="en-US" dirty="0"/>
+              </a:p>
+            </p:txBody>
+          </p:sp>
+        </mc:Choice>
+        <mc:Fallback>
+          <p:sp>
+            <p:nvSpPr>
+              <p:cNvPr id="27" name="TextBox 26"/>
+              <p:cNvSpPr txBox="1">
+                <a:spLocks noRot="1" noChangeAspect="1" noMove="1" noResize="1" noEditPoints="1" noAdjustHandles="1" noChangeArrowheads="1" noChangeShapeType="1" noTextEdit="1"/>
+              </p:cNvSpPr>
+              <p:nvPr/>
+            </p:nvSpPr>
+            <p:spPr>
+              <a:xfrm>
+                <a:off x="3665157" y="5970050"/>
+                <a:ext cx="2156424" cy="669094"/>
+              </a:xfrm>
+              <a:prstGeom prst="rect">
+                <a:avLst/>
+              </a:prstGeom>
+              <a:blipFill>
+                <a:blip r:embed="rId3"/>
+                <a:stretch>
+                  <a:fillRect/>
+                </a:stretch>
+              </a:blipFill>
+            </p:spPr>
+            <p:txBody>
+              <a:bodyPr/>
+              <a:lstStyle/>
+              <a:p>
+                <a:r>
+                  <a:rPr lang="en-US">
+                    <a:noFill/>
+                  </a:rPr>
+                  <a:t> </a:t>
+                </a:r>
+              </a:p>
+            </p:txBody>
+          </p:sp>
+        </mc:Fallback>
+      </mc:AlternateContent>
+      <p:sp>
+        <p:nvSpPr>
+          <p:cNvPr id="31" name="TextBox 30"/>
+          <p:cNvSpPr txBox="1"/>
+          <p:nvPr/>
+        </p:nvSpPr>
+        <p:spPr>
+          <a:xfrm>
+            <a:off x="4990330" y="2474113"/>
+            <a:ext cx="732893" cy="369332"/>
+          </a:xfrm>
+          <a:prstGeom prst="rect">
+            <a:avLst/>
+          </a:prstGeom>
+          <a:noFill/>
+        </p:spPr>
+        <p:txBody>
+          <a:bodyPr wrap="none" rtlCol="0">
+            <a:spAutoFit/>
+          </a:bodyPr>
+          <a:lstStyle/>
+          <a:p>
+            <a:r>
+              <a:rPr lang="en-US" dirty="0"/>
+              <a:t>p</a:t>
+            </a:r>
+            <a:r>
+              <a:rPr lang="en-US" dirty="0" smtClean="0"/>
+              <a:t>1-p2</a:t>
+            </a:r>
+            <a:endParaRPr lang="en-US" dirty="0"/>
+          </a:p>
+        </p:txBody>
+      </p:sp>
+    </p:spTree>
+    <p:extLst>
+      <p:ext uri="{BB962C8B-B14F-4D97-AF65-F5344CB8AC3E}">
+        <p14:creationId xmlns:p14="http://schemas.microsoft.com/office/powerpoint/2010/main" val="391723821"/>
       </p:ext>
     </p:extLst>
   </p:cSld>

</xml_diff>

<commit_message>
apply the physics engine on the force directed
</commit_message>
<xml_diff>
--- a/gr/physics/Figures.pptx
+++ b/gr/physics/Figures.pptx
@@ -4,9 +4,13 @@
   <p:sldMasterIdLst>
     <p:sldMasterId id="2147483648" r:id="rId1"/>
   </p:sldMasterIdLst>
+  <p:notesMasterIdLst>
+    <p:notesMasterId r:id="rId5"/>
+  </p:notesMasterIdLst>
   <p:sldIdLst>
     <p:sldId id="256" r:id="rId2"/>
     <p:sldId id="257" r:id="rId3"/>
+    <p:sldId id="258" r:id="rId4"/>
   </p:sldIdLst>
   <p:sldSz cx="12192000" cy="6858000"/>
   <p:notesSz cx="6858000" cy="9144000"/>
@@ -137,6 +141,356 @@
     </p:extLst>
   </p:cm>
 </p:cmLst>
+</file>
+
+<file path=ppt/notesMasters/notesMaster1.xml><?xml version="1.0" encoding="utf-8"?>
+<p:notesMaster xmlns:a="http://schemas.openxmlformats.org/drawingml/2006/main" xmlns:r="http://schemas.openxmlformats.org/officeDocument/2006/relationships" xmlns:p="http://schemas.openxmlformats.org/presentationml/2006/main">
+  <p:cSld>
+    <p:bg>
+      <p:bgRef idx="1001">
+        <a:schemeClr val="bg1"/>
+      </p:bgRef>
+    </p:bg>
+    <p:spTree>
+      <p:nvGrpSpPr>
+        <p:cNvPr id="1" name=""/>
+        <p:cNvGrpSpPr/>
+        <p:nvPr/>
+      </p:nvGrpSpPr>
+      <p:grpSpPr>
+        <a:xfrm>
+          <a:off x="0" y="0"/>
+          <a:ext cx="0" cy="0"/>
+          <a:chOff x="0" y="0"/>
+          <a:chExt cx="0" cy="0"/>
+        </a:xfrm>
+      </p:grpSpPr>
+      <p:sp>
+        <p:nvSpPr>
+          <p:cNvPr id="2" name="Header Placeholder 1"/>
+          <p:cNvSpPr>
+            <a:spLocks noGrp="1"/>
+          </p:cNvSpPr>
+          <p:nvPr>
+            <p:ph type="hdr" sz="quarter"/>
+          </p:nvPr>
+        </p:nvSpPr>
+        <p:spPr>
+          <a:xfrm>
+            <a:off x="0" y="0"/>
+            <a:ext cx="2971800" cy="458788"/>
+          </a:xfrm>
+          <a:prstGeom prst="rect">
+            <a:avLst/>
+          </a:prstGeom>
+        </p:spPr>
+        <p:txBody>
+          <a:bodyPr vert="horz" lIns="91440" tIns="45720" rIns="91440" bIns="45720" rtlCol="0"/>
+          <a:lstStyle>
+            <a:lvl1pPr algn="l">
+              <a:defRPr sz="1200"/>
+            </a:lvl1pPr>
+          </a:lstStyle>
+          <a:p>
+            <a:endParaRPr lang="en-US"/>
+          </a:p>
+        </p:txBody>
+      </p:sp>
+      <p:sp>
+        <p:nvSpPr>
+          <p:cNvPr id="3" name="Date Placeholder 2"/>
+          <p:cNvSpPr>
+            <a:spLocks noGrp="1"/>
+          </p:cNvSpPr>
+          <p:nvPr>
+            <p:ph type="dt" idx="1"/>
+          </p:nvPr>
+        </p:nvSpPr>
+        <p:spPr>
+          <a:xfrm>
+            <a:off x="3884613" y="0"/>
+            <a:ext cx="2971800" cy="458788"/>
+          </a:xfrm>
+          <a:prstGeom prst="rect">
+            <a:avLst/>
+          </a:prstGeom>
+        </p:spPr>
+        <p:txBody>
+          <a:bodyPr vert="horz" lIns="91440" tIns="45720" rIns="91440" bIns="45720" rtlCol="0"/>
+          <a:lstStyle>
+            <a:lvl1pPr algn="r">
+              <a:defRPr sz="1200"/>
+            </a:lvl1pPr>
+          </a:lstStyle>
+          <a:p>
+            <a:fld id="{52675B74-959A-401B-8E5B-BDD16E7B3D2E}" type="datetimeFigureOut">
+              <a:rPr lang="en-US" smtClean="0"/>
+              <a:t>7/8/2017</a:t>
+            </a:fld>
+            <a:endParaRPr lang="en-US"/>
+          </a:p>
+        </p:txBody>
+      </p:sp>
+      <p:sp>
+        <p:nvSpPr>
+          <p:cNvPr id="4" name="Slide Image Placeholder 3"/>
+          <p:cNvSpPr>
+            <a:spLocks noGrp="1" noRot="1" noChangeAspect="1"/>
+          </p:cNvSpPr>
+          <p:nvPr>
+            <p:ph type="sldImg" idx="2"/>
+          </p:nvPr>
+        </p:nvSpPr>
+        <p:spPr>
+          <a:xfrm>
+            <a:off x="685800" y="1143000"/>
+            <a:ext cx="5486400" cy="3086100"/>
+          </a:xfrm>
+          <a:prstGeom prst="rect">
+            <a:avLst/>
+          </a:prstGeom>
+          <a:noFill/>
+          <a:ln w="12700">
+            <a:solidFill>
+              <a:prstClr val="black"/>
+            </a:solidFill>
+          </a:ln>
+        </p:spPr>
+        <p:txBody>
+          <a:bodyPr vert="horz" lIns="91440" tIns="45720" rIns="91440" bIns="45720" rtlCol="0" anchor="ctr"/>
+          <a:lstStyle/>
+          <a:p>
+            <a:endParaRPr lang="en-US"/>
+          </a:p>
+        </p:txBody>
+      </p:sp>
+      <p:sp>
+        <p:nvSpPr>
+          <p:cNvPr id="5" name="Notes Placeholder 4"/>
+          <p:cNvSpPr>
+            <a:spLocks noGrp="1"/>
+          </p:cNvSpPr>
+          <p:nvPr>
+            <p:ph type="body" sz="quarter" idx="3"/>
+          </p:nvPr>
+        </p:nvSpPr>
+        <p:spPr>
+          <a:xfrm>
+            <a:off x="685800" y="4400550"/>
+            <a:ext cx="5486400" cy="3600450"/>
+          </a:xfrm>
+          <a:prstGeom prst="rect">
+            <a:avLst/>
+          </a:prstGeom>
+        </p:spPr>
+        <p:txBody>
+          <a:bodyPr vert="horz" lIns="91440" tIns="45720" rIns="91440" bIns="45720" rtlCol="0"/>
+          <a:lstStyle/>
+          <a:p>
+            <a:pPr lvl="0"/>
+            <a:r>
+              <a:rPr lang="en-US" smtClean="0"/>
+              <a:t>Edit Master text styles</a:t>
+            </a:r>
+          </a:p>
+          <a:p>
+            <a:pPr lvl="1"/>
+            <a:r>
+              <a:rPr lang="en-US" smtClean="0"/>
+              <a:t>Second level</a:t>
+            </a:r>
+          </a:p>
+          <a:p>
+            <a:pPr lvl="2"/>
+            <a:r>
+              <a:rPr lang="en-US" smtClean="0"/>
+              <a:t>Third level</a:t>
+            </a:r>
+          </a:p>
+          <a:p>
+            <a:pPr lvl="3"/>
+            <a:r>
+              <a:rPr lang="en-US" smtClean="0"/>
+              <a:t>Fourth level</a:t>
+            </a:r>
+          </a:p>
+          <a:p>
+            <a:pPr lvl="4"/>
+            <a:r>
+              <a:rPr lang="en-US" smtClean="0"/>
+              <a:t>Fifth level</a:t>
+            </a:r>
+            <a:endParaRPr lang="en-US"/>
+          </a:p>
+        </p:txBody>
+      </p:sp>
+      <p:sp>
+        <p:nvSpPr>
+          <p:cNvPr id="6" name="Footer Placeholder 5"/>
+          <p:cNvSpPr>
+            <a:spLocks noGrp="1"/>
+          </p:cNvSpPr>
+          <p:nvPr>
+            <p:ph type="ftr" sz="quarter" idx="4"/>
+          </p:nvPr>
+        </p:nvSpPr>
+        <p:spPr>
+          <a:xfrm>
+            <a:off x="0" y="8685213"/>
+            <a:ext cx="2971800" cy="458787"/>
+          </a:xfrm>
+          <a:prstGeom prst="rect">
+            <a:avLst/>
+          </a:prstGeom>
+        </p:spPr>
+        <p:txBody>
+          <a:bodyPr vert="horz" lIns="91440" tIns="45720" rIns="91440" bIns="45720" rtlCol="0" anchor="b"/>
+          <a:lstStyle>
+            <a:lvl1pPr algn="l">
+              <a:defRPr sz="1200"/>
+            </a:lvl1pPr>
+          </a:lstStyle>
+          <a:p>
+            <a:endParaRPr lang="en-US"/>
+          </a:p>
+        </p:txBody>
+      </p:sp>
+      <p:sp>
+        <p:nvSpPr>
+          <p:cNvPr id="7" name="Slide Number Placeholder 6"/>
+          <p:cNvSpPr>
+            <a:spLocks noGrp="1"/>
+          </p:cNvSpPr>
+          <p:nvPr>
+            <p:ph type="sldNum" sz="quarter" idx="5"/>
+          </p:nvPr>
+        </p:nvSpPr>
+        <p:spPr>
+          <a:xfrm>
+            <a:off x="3884613" y="8685213"/>
+            <a:ext cx="2971800" cy="458787"/>
+          </a:xfrm>
+          <a:prstGeom prst="rect">
+            <a:avLst/>
+          </a:prstGeom>
+        </p:spPr>
+        <p:txBody>
+          <a:bodyPr vert="horz" lIns="91440" tIns="45720" rIns="91440" bIns="45720" rtlCol="0" anchor="b"/>
+          <a:lstStyle>
+            <a:lvl1pPr algn="r">
+              <a:defRPr sz="1200"/>
+            </a:lvl1pPr>
+          </a:lstStyle>
+          <a:p>
+            <a:fld id="{C280E907-96DE-41E0-AF29-50EE5CD257BA}" type="slidenum">
+              <a:rPr lang="en-US" smtClean="0"/>
+              <a:t>‹#›</a:t>
+            </a:fld>
+            <a:endParaRPr lang="en-US"/>
+          </a:p>
+        </p:txBody>
+      </p:sp>
+    </p:spTree>
+    <p:extLst>
+      <p:ext uri="{BB962C8B-B14F-4D97-AF65-F5344CB8AC3E}">
+        <p14:creationId xmlns:p14="http://schemas.microsoft.com/office/powerpoint/2010/main" val="2410563929"/>
+      </p:ext>
+    </p:extLst>
+  </p:cSld>
+  <p:clrMap bg1="lt1" tx1="dk1" bg2="lt2" tx2="dk2" accent1="accent1" accent2="accent2" accent3="accent3" accent4="accent4" accent5="accent5" accent6="accent6" hlink="hlink" folHlink="folHlink"/>
+  <p:notesStyle>
+    <a:lvl1pPr marL="0" algn="l" defTabSz="914400" rtl="0" eaLnBrk="1" latinLnBrk="0" hangingPunct="1">
+      <a:defRPr sz="1200" kern="1200">
+        <a:solidFill>
+          <a:schemeClr val="tx1"/>
+        </a:solidFill>
+        <a:latin typeface="+mn-lt"/>
+        <a:ea typeface="+mn-ea"/>
+        <a:cs typeface="+mn-cs"/>
+      </a:defRPr>
+    </a:lvl1pPr>
+    <a:lvl2pPr marL="457200" algn="l" defTabSz="914400" rtl="0" eaLnBrk="1" latinLnBrk="0" hangingPunct="1">
+      <a:defRPr sz="1200" kern="1200">
+        <a:solidFill>
+          <a:schemeClr val="tx1"/>
+        </a:solidFill>
+        <a:latin typeface="+mn-lt"/>
+        <a:ea typeface="+mn-ea"/>
+        <a:cs typeface="+mn-cs"/>
+      </a:defRPr>
+    </a:lvl2pPr>
+    <a:lvl3pPr marL="914400" algn="l" defTabSz="914400" rtl="0" eaLnBrk="1" latinLnBrk="0" hangingPunct="1">
+      <a:defRPr sz="1200" kern="1200">
+        <a:solidFill>
+          <a:schemeClr val="tx1"/>
+        </a:solidFill>
+        <a:latin typeface="+mn-lt"/>
+        <a:ea typeface="+mn-ea"/>
+        <a:cs typeface="+mn-cs"/>
+      </a:defRPr>
+    </a:lvl3pPr>
+    <a:lvl4pPr marL="1371600" algn="l" defTabSz="914400" rtl="0" eaLnBrk="1" latinLnBrk="0" hangingPunct="1">
+      <a:defRPr sz="1200" kern="1200">
+        <a:solidFill>
+          <a:schemeClr val="tx1"/>
+        </a:solidFill>
+        <a:latin typeface="+mn-lt"/>
+        <a:ea typeface="+mn-ea"/>
+        <a:cs typeface="+mn-cs"/>
+      </a:defRPr>
+    </a:lvl4pPr>
+    <a:lvl5pPr marL="1828800" algn="l" defTabSz="914400" rtl="0" eaLnBrk="1" latinLnBrk="0" hangingPunct="1">
+      <a:defRPr sz="1200" kern="1200">
+        <a:solidFill>
+          <a:schemeClr val="tx1"/>
+        </a:solidFill>
+        <a:latin typeface="+mn-lt"/>
+        <a:ea typeface="+mn-ea"/>
+        <a:cs typeface="+mn-cs"/>
+      </a:defRPr>
+    </a:lvl5pPr>
+    <a:lvl6pPr marL="2286000" algn="l" defTabSz="914400" rtl="0" eaLnBrk="1" latinLnBrk="0" hangingPunct="1">
+      <a:defRPr sz="1200" kern="1200">
+        <a:solidFill>
+          <a:schemeClr val="tx1"/>
+        </a:solidFill>
+        <a:latin typeface="+mn-lt"/>
+        <a:ea typeface="+mn-ea"/>
+        <a:cs typeface="+mn-cs"/>
+      </a:defRPr>
+    </a:lvl6pPr>
+    <a:lvl7pPr marL="2743200" algn="l" defTabSz="914400" rtl="0" eaLnBrk="1" latinLnBrk="0" hangingPunct="1">
+      <a:defRPr sz="1200" kern="1200">
+        <a:solidFill>
+          <a:schemeClr val="tx1"/>
+        </a:solidFill>
+        <a:latin typeface="+mn-lt"/>
+        <a:ea typeface="+mn-ea"/>
+        <a:cs typeface="+mn-cs"/>
+      </a:defRPr>
+    </a:lvl7pPr>
+    <a:lvl8pPr marL="3200400" algn="l" defTabSz="914400" rtl="0" eaLnBrk="1" latinLnBrk="0" hangingPunct="1">
+      <a:defRPr sz="1200" kern="1200">
+        <a:solidFill>
+          <a:schemeClr val="tx1"/>
+        </a:solidFill>
+        <a:latin typeface="+mn-lt"/>
+        <a:ea typeface="+mn-ea"/>
+        <a:cs typeface="+mn-cs"/>
+      </a:defRPr>
+    </a:lvl8pPr>
+    <a:lvl9pPr marL="3657600" algn="l" defTabSz="914400" rtl="0" eaLnBrk="1" latinLnBrk="0" hangingPunct="1">
+      <a:defRPr sz="1200" kern="1200">
+        <a:solidFill>
+          <a:schemeClr val="tx1"/>
+        </a:solidFill>
+        <a:latin typeface="+mn-lt"/>
+        <a:ea typeface="+mn-ea"/>
+        <a:cs typeface="+mn-cs"/>
+      </a:defRPr>
+    </a:lvl9pPr>
+  </p:notesStyle>
+</p:notesMaster>
 </file>
 
 <file path=ppt/slideLayouts/slideLayout1.xml><?xml version="1.0" encoding="utf-8"?>
@@ -4072,25 +4426,6 @@
           </a:p>
         </p:txBody>
       </p:sp>
-      <p:sp>
-        <p:nvSpPr>
-          <p:cNvPr id="3" name="Content Placeholder 2"/>
-          <p:cNvSpPr>
-            <a:spLocks noGrp="1"/>
-          </p:cNvSpPr>
-          <p:nvPr>
-            <p:ph idx="1"/>
-          </p:nvPr>
-        </p:nvSpPr>
-        <p:spPr/>
-        <p:txBody>
-          <a:bodyPr/>
-          <a:lstStyle/>
-          <a:p>
-            <a:endParaRPr lang="en-US"/>
-          </a:p>
-        </p:txBody>
-      </p:sp>
     </p:spTree>
     <p:extLst>
       <p:ext uri="{BB962C8B-B14F-4D97-AF65-F5344CB8AC3E}">
@@ -4306,8 +4641,8 @@
             </a:fontRef>
           </p:style>
         </p:cxnSp>
-        <mc:AlternateContent xmlns:mc="http://schemas.openxmlformats.org/markup-compatibility/2006">
-          <mc:Choice xmlns:a14="http://schemas.microsoft.com/office/drawing/2010/main" Requires="a14">
+        <mc:AlternateContent xmlns:mc="http://schemas.openxmlformats.org/markup-compatibility/2006" xmlns:a14="http://schemas.microsoft.com/office/drawing/2010/main">
+          <mc:Choice Requires="a14">
             <p:sp>
               <p:nvSpPr>
                 <p:cNvPr id="13" name="TextBox 12"/>
@@ -4425,7 +4760,7 @@
               </p:txBody>
             </p:sp>
           </mc:Choice>
-          <mc:Fallback>
+          <mc:Fallback xmlns="">
             <p:sp>
               <p:nvSpPr>
                 <p:cNvPr id="13" name="TextBox 12"/>
@@ -4593,8 +4928,8 @@
             </a:fontRef>
           </p:style>
         </p:cxnSp>
-        <mc:AlternateContent xmlns:mc="http://schemas.openxmlformats.org/markup-compatibility/2006">
-          <mc:Choice xmlns:a14="http://schemas.microsoft.com/office/drawing/2010/main" Requires="a14">
+        <mc:AlternateContent xmlns:mc="http://schemas.openxmlformats.org/markup-compatibility/2006" xmlns:a14="http://schemas.microsoft.com/office/drawing/2010/main">
+          <mc:Choice Requires="a14">
             <p:sp>
               <p:nvSpPr>
                 <p:cNvPr id="27" name="TextBox 26"/>
@@ -4751,7 +5086,7 @@
               </p:txBody>
             </p:sp>
           </mc:Choice>
-          <mc:Fallback>
+          <mc:Fallback xmlns="">
             <p:sp>
               <p:nvSpPr>
                 <p:cNvPr id="27" name="TextBox 26"/>
@@ -4829,6 +5164,565 @@
     <p:extLst>
       <p:ext uri="{BB962C8B-B14F-4D97-AF65-F5344CB8AC3E}">
         <p14:creationId xmlns:p14="http://schemas.microsoft.com/office/powerpoint/2010/main" val="391723821"/>
+      </p:ext>
+    </p:extLst>
+  </p:cSld>
+  <p:clrMapOvr>
+    <a:masterClrMapping/>
+  </p:clrMapOvr>
+</p:sld>
+</file>
+
+<file path=ppt/slides/slide3.xml><?xml version="1.0" encoding="utf-8"?>
+<p:sld xmlns:a="http://schemas.openxmlformats.org/drawingml/2006/main" xmlns:r="http://schemas.openxmlformats.org/officeDocument/2006/relationships" xmlns:p="http://schemas.openxmlformats.org/presentationml/2006/main">
+  <p:cSld>
+    <p:spTree>
+      <p:nvGrpSpPr>
+        <p:cNvPr id="1" name=""/>
+        <p:cNvGrpSpPr/>
+        <p:nvPr/>
+      </p:nvGrpSpPr>
+      <p:grpSpPr>
+        <a:xfrm>
+          <a:off x="0" y="0"/>
+          <a:ext cx="0" cy="0"/>
+          <a:chOff x="0" y="0"/>
+          <a:chExt cx="0" cy="0"/>
+        </a:xfrm>
+      </p:grpSpPr>
+      <p:sp>
+        <p:nvSpPr>
+          <p:cNvPr id="2" name="Title 1"/>
+          <p:cNvSpPr>
+            <a:spLocks noGrp="1"/>
+          </p:cNvSpPr>
+          <p:nvPr>
+            <p:ph type="title"/>
+          </p:nvPr>
+        </p:nvSpPr>
+        <p:spPr/>
+        <p:txBody>
+          <a:bodyPr/>
+          <a:lstStyle/>
+          <a:p>
+            <a:r>
+              <a:rPr lang="en-US" dirty="0" smtClean="0"/>
+              <a:t>Resolution </a:t>
+            </a:r>
+            <a:r>
+              <a:rPr lang="en-US" dirty="0"/>
+              <a:t>of </a:t>
+            </a:r>
+            <a:r>
+              <a:rPr lang="en-US" dirty="0" smtClean="0"/>
+              <a:t>Forces</a:t>
+            </a:r>
+            <a:endParaRPr lang="en-US" dirty="0"/>
+          </a:p>
+        </p:txBody>
+      </p:sp>
+      <p:cxnSp>
+        <p:nvCxnSpPr>
+          <p:cNvPr id="5" name="Straight Arrow Connector 4"/>
+          <p:cNvCxnSpPr/>
+          <p:nvPr/>
+        </p:nvCxnSpPr>
+        <p:spPr>
+          <a:xfrm>
+            <a:off x="1285103" y="5708822"/>
+            <a:ext cx="8853616" cy="0"/>
+          </a:xfrm>
+          <a:prstGeom prst="straightConnector1">
+            <a:avLst/>
+          </a:prstGeom>
+          <a:ln>
+            <a:tailEnd type="triangle"/>
+          </a:ln>
+        </p:spPr>
+        <p:style>
+          <a:lnRef idx="1">
+            <a:schemeClr val="accent1"/>
+          </a:lnRef>
+          <a:fillRef idx="0">
+            <a:schemeClr val="accent1"/>
+          </a:fillRef>
+          <a:effectRef idx="0">
+            <a:schemeClr val="accent1"/>
+          </a:effectRef>
+          <a:fontRef idx="minor">
+            <a:schemeClr val="tx1"/>
+          </a:fontRef>
+        </p:style>
+      </p:cxnSp>
+      <p:cxnSp>
+        <p:nvCxnSpPr>
+          <p:cNvPr id="6" name="Straight Arrow Connector 5"/>
+          <p:cNvCxnSpPr/>
+          <p:nvPr/>
+        </p:nvCxnSpPr>
+        <p:spPr>
+          <a:xfrm flipV="1">
+            <a:off x="2346754" y="2014152"/>
+            <a:ext cx="13387" cy="4242487"/>
+          </a:xfrm>
+          <a:prstGeom prst="straightConnector1">
+            <a:avLst/>
+          </a:prstGeom>
+          <a:ln>
+            <a:tailEnd type="triangle"/>
+          </a:ln>
+        </p:spPr>
+        <p:style>
+          <a:lnRef idx="1">
+            <a:schemeClr val="accent1"/>
+          </a:lnRef>
+          <a:fillRef idx="0">
+            <a:schemeClr val="accent1"/>
+          </a:fillRef>
+          <a:effectRef idx="0">
+            <a:schemeClr val="accent1"/>
+          </a:effectRef>
+          <a:fontRef idx="minor">
+            <a:schemeClr val="tx1"/>
+          </a:fontRef>
+        </p:style>
+      </p:cxnSp>
+      <p:cxnSp>
+        <p:nvCxnSpPr>
+          <p:cNvPr id="9" name="Straight Arrow Connector 8"/>
+          <p:cNvCxnSpPr/>
+          <p:nvPr/>
+        </p:nvCxnSpPr>
+        <p:spPr>
+          <a:xfrm flipV="1">
+            <a:off x="2346754" y="2625811"/>
+            <a:ext cx="4505068" cy="3083012"/>
+          </a:xfrm>
+          <a:prstGeom prst="straightConnector1">
+            <a:avLst/>
+          </a:prstGeom>
+          <a:ln w="63500">
+            <a:solidFill>
+              <a:srgbClr val="FF0000"/>
+            </a:solidFill>
+            <a:prstDash val="sysDash"/>
+            <a:tailEnd type="triangle"/>
+          </a:ln>
+        </p:spPr>
+        <p:style>
+          <a:lnRef idx="1">
+            <a:schemeClr val="accent1"/>
+          </a:lnRef>
+          <a:fillRef idx="0">
+            <a:schemeClr val="accent1"/>
+          </a:fillRef>
+          <a:effectRef idx="0">
+            <a:schemeClr val="accent1"/>
+          </a:effectRef>
+          <a:fontRef idx="minor">
+            <a:schemeClr val="tx1"/>
+          </a:fontRef>
+        </p:style>
+      </p:cxnSp>
+      <p:cxnSp>
+        <p:nvCxnSpPr>
+          <p:cNvPr id="13" name="Straight Connector 12"/>
+          <p:cNvCxnSpPr/>
+          <p:nvPr/>
+        </p:nvCxnSpPr>
+        <p:spPr>
+          <a:xfrm>
+            <a:off x="2360141" y="2625811"/>
+            <a:ext cx="4649230" cy="0"/>
+          </a:xfrm>
+          <a:prstGeom prst="line">
+            <a:avLst/>
+          </a:prstGeom>
+        </p:spPr>
+        <p:style>
+          <a:lnRef idx="1">
+            <a:schemeClr val="accent1"/>
+          </a:lnRef>
+          <a:fillRef idx="0">
+            <a:schemeClr val="accent1"/>
+          </a:fillRef>
+          <a:effectRef idx="0">
+            <a:schemeClr val="accent1"/>
+          </a:effectRef>
+          <a:fontRef idx="minor">
+            <a:schemeClr val="tx1"/>
+          </a:fontRef>
+        </p:style>
+      </p:cxnSp>
+      <p:cxnSp>
+        <p:nvCxnSpPr>
+          <p:cNvPr id="15" name="Straight Connector 14"/>
+          <p:cNvCxnSpPr/>
+          <p:nvPr/>
+        </p:nvCxnSpPr>
+        <p:spPr>
+          <a:xfrm flipH="1" flipV="1">
+            <a:off x="6851822" y="2625811"/>
+            <a:ext cx="39130" cy="3379573"/>
+          </a:xfrm>
+          <a:prstGeom prst="line">
+            <a:avLst/>
+          </a:prstGeom>
+        </p:spPr>
+        <p:style>
+          <a:lnRef idx="1">
+            <a:schemeClr val="accent1"/>
+          </a:lnRef>
+          <a:fillRef idx="0">
+            <a:schemeClr val="accent1"/>
+          </a:fillRef>
+          <a:effectRef idx="0">
+            <a:schemeClr val="accent1"/>
+          </a:effectRef>
+          <a:fontRef idx="minor">
+            <a:schemeClr val="tx1"/>
+          </a:fontRef>
+        </p:style>
+      </p:cxnSp>
+      <p:cxnSp>
+        <p:nvCxnSpPr>
+          <p:cNvPr id="19" name="Straight Arrow Connector 18"/>
+          <p:cNvCxnSpPr/>
+          <p:nvPr/>
+        </p:nvCxnSpPr>
+        <p:spPr>
+          <a:xfrm flipH="1" flipV="1">
+            <a:off x="3133467" y="5244758"/>
+            <a:ext cx="166817" cy="432485"/>
+          </a:xfrm>
+          <a:prstGeom prst="straightConnector1">
+            <a:avLst/>
+          </a:prstGeom>
+          <a:ln>
+            <a:tailEnd type="triangle"/>
+          </a:ln>
+        </p:spPr>
+        <p:style>
+          <a:lnRef idx="1">
+            <a:schemeClr val="accent1"/>
+          </a:lnRef>
+          <a:fillRef idx="0">
+            <a:schemeClr val="accent1"/>
+          </a:fillRef>
+          <a:effectRef idx="0">
+            <a:schemeClr val="accent1"/>
+          </a:effectRef>
+          <a:fontRef idx="minor">
+            <a:schemeClr val="tx1"/>
+          </a:fontRef>
+        </p:style>
+      </p:cxnSp>
+      <p:sp>
+        <p:nvSpPr>
+          <p:cNvPr id="21" name="TextBox 20"/>
+          <p:cNvSpPr txBox="1"/>
+          <p:nvPr/>
+        </p:nvSpPr>
+        <p:spPr>
+          <a:xfrm>
+            <a:off x="3256006" y="5276335"/>
+            <a:ext cx="295274" cy="369332"/>
+          </a:xfrm>
+          <a:prstGeom prst="rect">
+            <a:avLst/>
+          </a:prstGeom>
+          <a:noFill/>
+        </p:spPr>
+        <p:txBody>
+          <a:bodyPr wrap="none" rtlCol="0">
+            <a:spAutoFit/>
+          </a:bodyPr>
+          <a:lstStyle/>
+          <a:p>
+            <a:r>
+              <a:rPr lang="en-US" dirty="0" smtClean="0"/>
+              <a:t>a</a:t>
+            </a:r>
+            <a:endParaRPr lang="en-US" dirty="0"/>
+          </a:p>
+        </p:txBody>
+      </p:sp>
+      <mc:AlternateContent xmlns:mc="http://schemas.openxmlformats.org/markup-compatibility/2006">
+        <mc:Choice xmlns:a14="http://schemas.microsoft.com/office/drawing/2010/main" Requires="a14">
+          <p:sp>
+            <p:nvSpPr>
+              <p:cNvPr id="22" name="TextBox 21"/>
+              <p:cNvSpPr txBox="1"/>
+              <p:nvPr/>
+            </p:nvSpPr>
+            <p:spPr>
+              <a:xfrm>
+                <a:off x="7376984" y="3441357"/>
+                <a:ext cx="1277914" cy="609077"/>
+              </a:xfrm>
+              <a:prstGeom prst="rect">
+                <a:avLst/>
+              </a:prstGeom>
+              <a:noFill/>
+            </p:spPr>
+            <p:txBody>
+              <a:bodyPr wrap="none" rtlCol="0">
+                <a:spAutoFit/>
+              </a:bodyPr>
+              <a:lstStyle/>
+              <a:p>
+                <a14:m>
+                  <m:oMathPara xmlns:m="http://schemas.openxmlformats.org/officeDocument/2006/math">
+                    <m:oMathParaPr>
+                      <m:jc m:val="centerGroup"/>
+                    </m:oMathParaPr>
+                    <m:oMath xmlns:m="http://schemas.openxmlformats.org/officeDocument/2006/math">
+                      <m:func>
+                        <m:funcPr>
+                          <m:ctrlPr>
+                            <a:rPr lang="en-US" i="1" smtClean="0">
+                              <a:latin typeface="Cambria Math" panose="02040503050406030204" pitchFamily="18" charset="0"/>
+                            </a:rPr>
+                          </m:ctrlPr>
+                        </m:funcPr>
+                        <m:fName>
+                          <m:r>
+                            <m:rPr>
+                              <m:sty m:val="p"/>
+                            </m:rPr>
+                            <a:rPr lang="en-US" i="0" smtClean="0">
+                              <a:latin typeface="Cambria Math" panose="02040503050406030204" pitchFamily="18" charset="0"/>
+                            </a:rPr>
+                            <m:t>sin</m:t>
+                          </m:r>
+                        </m:fName>
+                        <m:e>
+                          <m:r>
+                            <a:rPr lang="en-US" b="0" i="1" smtClean="0">
+                              <a:latin typeface="Cambria Math" panose="02040503050406030204" pitchFamily="18" charset="0"/>
+                            </a:rPr>
+                            <m:t>𝑎</m:t>
+                          </m:r>
+                        </m:e>
+                      </m:func>
+                      <m:r>
+                        <a:rPr lang="en-US" b="0" i="1" smtClean="0">
+                          <a:latin typeface="Cambria Math" panose="02040503050406030204" pitchFamily="18" charset="0"/>
+                        </a:rPr>
+                        <m:t>=</m:t>
+                      </m:r>
+                      <m:f>
+                        <m:fPr>
+                          <m:ctrlPr>
+                            <a:rPr lang="en-US" b="0" i="1" smtClean="0">
+                              <a:latin typeface="Cambria Math" panose="02040503050406030204" pitchFamily="18" charset="0"/>
+                            </a:rPr>
+                          </m:ctrlPr>
+                        </m:fPr>
+                        <m:num>
+                          <m:r>
+                            <a:rPr lang="en-US" b="0" i="1" smtClean="0">
+                              <a:latin typeface="Cambria Math" panose="02040503050406030204" pitchFamily="18" charset="0"/>
+                            </a:rPr>
+                            <m:t>𝐹𝑦</m:t>
+                          </m:r>
+                        </m:num>
+                        <m:den>
+                          <m:r>
+                            <a:rPr lang="en-US" b="0" i="1" smtClean="0">
+                              <a:latin typeface="Cambria Math" panose="02040503050406030204" pitchFamily="18" charset="0"/>
+                            </a:rPr>
+                            <m:t>𝐹</m:t>
+                          </m:r>
+                        </m:den>
+                      </m:f>
+                    </m:oMath>
+                  </m:oMathPara>
+                </a14:m>
+                <a:endParaRPr lang="en-US" dirty="0"/>
+              </a:p>
+            </p:txBody>
+          </p:sp>
+        </mc:Choice>
+        <mc:Fallback>
+          <p:sp>
+            <p:nvSpPr>
+              <p:cNvPr id="22" name="TextBox 21"/>
+              <p:cNvSpPr txBox="1">
+                <a:spLocks noRot="1" noChangeAspect="1" noMove="1" noResize="1" noEditPoints="1" noAdjustHandles="1" noChangeArrowheads="1" noChangeShapeType="1" noTextEdit="1"/>
+              </p:cNvSpPr>
+              <p:nvPr/>
+            </p:nvSpPr>
+            <p:spPr>
+              <a:xfrm>
+                <a:off x="7376984" y="3441357"/>
+                <a:ext cx="1277914" cy="609077"/>
+              </a:xfrm>
+              <a:prstGeom prst="rect">
+                <a:avLst/>
+              </a:prstGeom>
+              <a:blipFill>
+                <a:blip r:embed="rId2"/>
+                <a:stretch>
+                  <a:fillRect/>
+                </a:stretch>
+              </a:blipFill>
+            </p:spPr>
+            <p:txBody>
+              <a:bodyPr/>
+              <a:lstStyle/>
+              <a:p>
+                <a:r>
+                  <a:rPr lang="en-US">
+                    <a:noFill/>
+                  </a:rPr>
+                  <a:t> </a:t>
+                </a:r>
+              </a:p>
+            </p:txBody>
+          </p:sp>
+        </mc:Fallback>
+      </mc:AlternateContent>
+      <mc:AlternateContent xmlns:mc="http://schemas.openxmlformats.org/markup-compatibility/2006">
+        <mc:Choice xmlns:a14="http://schemas.microsoft.com/office/drawing/2010/main" Requires="a14">
+          <p:sp>
+            <p:nvSpPr>
+              <p:cNvPr id="23" name="TextBox 22"/>
+              <p:cNvSpPr txBox="1"/>
+              <p:nvPr/>
+            </p:nvSpPr>
+            <p:spPr>
+              <a:xfrm>
+                <a:off x="3798139" y="5771978"/>
+                <a:ext cx="1304973" cy="609077"/>
+              </a:xfrm>
+              <a:prstGeom prst="rect">
+                <a:avLst/>
+              </a:prstGeom>
+              <a:noFill/>
+            </p:spPr>
+            <p:txBody>
+              <a:bodyPr wrap="none" rtlCol="0">
+                <a:spAutoFit/>
+              </a:bodyPr>
+              <a:lstStyle/>
+              <a:p>
+                <a14:m>
+                  <m:oMathPara xmlns:m="http://schemas.openxmlformats.org/officeDocument/2006/math">
+                    <m:oMathParaPr>
+                      <m:jc m:val="centerGroup"/>
+                    </m:oMathParaPr>
+                    <m:oMath xmlns:m="http://schemas.openxmlformats.org/officeDocument/2006/math">
+                      <m:func>
+                        <m:funcPr>
+                          <m:ctrlPr>
+                            <a:rPr lang="en-US" i="1" smtClean="0">
+                              <a:latin typeface="Cambria Math" panose="02040503050406030204" pitchFamily="18" charset="0"/>
+                            </a:rPr>
+                          </m:ctrlPr>
+                        </m:funcPr>
+                        <m:fName>
+                          <m:r>
+                            <m:rPr>
+                              <m:sty m:val="p"/>
+                            </m:rPr>
+                            <a:rPr lang="en-US" b="0" i="0" smtClean="0">
+                              <a:latin typeface="Cambria Math" panose="02040503050406030204" pitchFamily="18" charset="0"/>
+                            </a:rPr>
+                            <m:t>cos</m:t>
+                          </m:r>
+                        </m:fName>
+                        <m:e>
+                          <m:r>
+                            <a:rPr lang="en-US" b="0" i="1" smtClean="0">
+                              <a:latin typeface="Cambria Math" panose="02040503050406030204" pitchFamily="18" charset="0"/>
+                            </a:rPr>
+                            <m:t>𝑎</m:t>
+                          </m:r>
+                        </m:e>
+                      </m:func>
+                      <m:r>
+                        <a:rPr lang="en-US" b="0" i="1" smtClean="0">
+                          <a:latin typeface="Cambria Math" panose="02040503050406030204" pitchFamily="18" charset="0"/>
+                        </a:rPr>
+                        <m:t>=</m:t>
+                      </m:r>
+                      <m:f>
+                        <m:fPr>
+                          <m:ctrlPr>
+                            <a:rPr lang="en-US" b="0" i="1" smtClean="0">
+                              <a:latin typeface="Cambria Math" panose="02040503050406030204" pitchFamily="18" charset="0"/>
+                            </a:rPr>
+                          </m:ctrlPr>
+                        </m:fPr>
+                        <m:num>
+                          <m:r>
+                            <a:rPr lang="en-US" b="0" i="1" smtClean="0">
+                              <a:latin typeface="Cambria Math" panose="02040503050406030204" pitchFamily="18" charset="0"/>
+                            </a:rPr>
+                            <m:t>𝐹𝑥</m:t>
+                          </m:r>
+                        </m:num>
+                        <m:den>
+                          <m:r>
+                            <a:rPr lang="en-US" b="0" i="1" smtClean="0">
+                              <a:latin typeface="Cambria Math" panose="02040503050406030204" pitchFamily="18" charset="0"/>
+                            </a:rPr>
+                            <m:t>𝐹</m:t>
+                          </m:r>
+                        </m:den>
+                      </m:f>
+                    </m:oMath>
+                  </m:oMathPara>
+                </a14:m>
+                <a:endParaRPr lang="en-US" dirty="0"/>
+              </a:p>
+            </p:txBody>
+          </p:sp>
+        </mc:Choice>
+        <mc:Fallback>
+          <p:sp>
+            <p:nvSpPr>
+              <p:cNvPr id="23" name="TextBox 22"/>
+              <p:cNvSpPr txBox="1">
+                <a:spLocks noRot="1" noChangeAspect="1" noMove="1" noResize="1" noEditPoints="1" noAdjustHandles="1" noChangeArrowheads="1" noChangeShapeType="1" noTextEdit="1"/>
+              </p:cNvSpPr>
+              <p:nvPr/>
+            </p:nvSpPr>
+            <p:spPr>
+              <a:xfrm>
+                <a:off x="3798139" y="5771978"/>
+                <a:ext cx="1304973" cy="609077"/>
+              </a:xfrm>
+              <a:prstGeom prst="rect">
+                <a:avLst/>
+              </a:prstGeom>
+              <a:blipFill>
+                <a:blip r:embed="rId3"/>
+                <a:stretch>
+                  <a:fillRect/>
+                </a:stretch>
+              </a:blipFill>
+            </p:spPr>
+            <p:txBody>
+              <a:bodyPr/>
+              <a:lstStyle/>
+              <a:p>
+                <a:r>
+                  <a:rPr lang="en-US">
+                    <a:noFill/>
+                  </a:rPr>
+                  <a:t> </a:t>
+                </a:r>
+              </a:p>
+            </p:txBody>
+          </p:sp>
+        </mc:Fallback>
+      </mc:AlternateContent>
+    </p:spTree>
+    <p:extLst>
+      <p:ext uri="{BB962C8B-B14F-4D97-AF65-F5344CB8AC3E}">
+        <p14:creationId xmlns:p14="http://schemas.microsoft.com/office/powerpoint/2010/main" val="730477070"/>
       </p:ext>
     </p:extLst>
   </p:cSld>
@@ -5097,4 +5991,265 @@
     </a:ext>
   </a:extLst>
 </a:theme>
+</file>
+
+<file path=ppt/theme/theme2.xml><?xml version="1.0" encoding="utf-8"?>
+<a:theme xmlns:a="http://schemas.openxmlformats.org/drawingml/2006/main" name="Office Theme">
+  <a:themeElements>
+    <a:clrScheme name="Office">
+      <a:dk1>
+        <a:sysClr val="windowText" lastClr="000000"/>
+      </a:dk1>
+      <a:lt1>
+        <a:sysClr val="window" lastClr="FFFFFF"/>
+      </a:lt1>
+      <a:dk2>
+        <a:srgbClr val="44546A"/>
+      </a:dk2>
+      <a:lt2>
+        <a:srgbClr val="E7E6E6"/>
+      </a:lt2>
+      <a:accent1>
+        <a:srgbClr val="5B9BD5"/>
+      </a:accent1>
+      <a:accent2>
+        <a:srgbClr val="ED7D31"/>
+      </a:accent2>
+      <a:accent3>
+        <a:srgbClr val="A5A5A5"/>
+      </a:accent3>
+      <a:accent4>
+        <a:srgbClr val="FFC000"/>
+      </a:accent4>
+      <a:accent5>
+        <a:srgbClr val="4472C4"/>
+      </a:accent5>
+      <a:accent6>
+        <a:srgbClr val="70AD47"/>
+      </a:accent6>
+      <a:hlink>
+        <a:srgbClr val="0563C1"/>
+      </a:hlink>
+      <a:folHlink>
+        <a:srgbClr val="954F72"/>
+      </a:folHlink>
+    </a:clrScheme>
+    <a:fontScheme name="Office">
+      <a:majorFont>
+        <a:latin typeface="Calibri Light" panose="020F0302020204030204"/>
+        <a:ea typeface=""/>
+        <a:cs typeface=""/>
+        <a:font script="Jpan" typeface="游ゴシック Light"/>
+        <a:font script="Hang" typeface="맑은 고딕"/>
+        <a:font script="Hans" typeface="等线 Light"/>
+        <a:font script="Hant" typeface="新細明體"/>
+        <a:font script="Arab" typeface="Times New Roman"/>
+        <a:font script="Hebr" typeface="Times New Roman"/>
+        <a:font script="Thai" typeface="Angsana New"/>
+        <a:font script="Ethi" typeface="Nyala"/>
+        <a:font script="Beng" typeface="Vrinda"/>
+        <a:font script="Gujr" typeface="Shruti"/>
+        <a:font script="Khmr" typeface="MoolBoran"/>
+        <a:font script="Knda" typeface="Tunga"/>
+        <a:font script="Guru" typeface="Raavi"/>
+        <a:font script="Cans" typeface="Euphemia"/>
+        <a:font script="Cher" typeface="Plantagenet Cherokee"/>
+        <a:font script="Yiii" typeface="Microsoft Yi Baiti"/>
+        <a:font script="Tibt" typeface="Microsoft Himalaya"/>
+        <a:font script="Thaa" typeface="MV Boli"/>
+        <a:font script="Deva" typeface="Mangal"/>
+        <a:font script="Telu" typeface="Gautami"/>
+        <a:font script="Taml" typeface="Latha"/>
+        <a:font script="Syrc" typeface="Estrangelo Edessa"/>
+        <a:font script="Orya" typeface="Kalinga"/>
+        <a:font script="Mlym" typeface="Kartika"/>
+        <a:font script="Laoo" typeface="DokChampa"/>
+        <a:font script="Sinh" typeface="Iskoola Pota"/>
+        <a:font script="Mong" typeface="Mongolian Baiti"/>
+        <a:font script="Viet" typeface="Times New Roman"/>
+        <a:font script="Uigh" typeface="Microsoft Uighur"/>
+        <a:font script="Geor" typeface="Sylfaen"/>
+      </a:majorFont>
+      <a:minorFont>
+        <a:latin typeface="Calibri" panose="020F0502020204030204"/>
+        <a:ea typeface=""/>
+        <a:cs typeface=""/>
+        <a:font script="Jpan" typeface="游ゴシック"/>
+        <a:font script="Hang" typeface="맑은 고딕"/>
+        <a:font script="Hans" typeface="等线"/>
+        <a:font script="Hant" typeface="新細明體"/>
+        <a:font script="Arab" typeface="Arial"/>
+        <a:font script="Hebr" typeface="Arial"/>
+        <a:font script="Thai" typeface="Cordia New"/>
+        <a:font script="Ethi" typeface="Nyala"/>
+        <a:font script="Beng" typeface="Vrinda"/>
+        <a:font script="Gujr" typeface="Shruti"/>
+        <a:font script="Khmr" typeface="DaunPenh"/>
+        <a:font script="Knda" typeface="Tunga"/>
+        <a:font script="Guru" typeface="Raavi"/>
+        <a:font script="Cans" typeface="Euphemia"/>
+        <a:font script="Cher" typeface="Plantagenet Cherokee"/>
+        <a:font script="Yiii" typeface="Microsoft Yi Baiti"/>
+        <a:font script="Tibt" typeface="Microsoft Himalaya"/>
+        <a:font script="Thaa" typeface="MV Boli"/>
+        <a:font script="Deva" typeface="Mangal"/>
+        <a:font script="Telu" typeface="Gautami"/>
+        <a:font script="Taml" typeface="Latha"/>
+        <a:font script="Syrc" typeface="Estrangelo Edessa"/>
+        <a:font script="Orya" typeface="Kalinga"/>
+        <a:font script="Mlym" typeface="Kartika"/>
+        <a:font script="Laoo" typeface="DokChampa"/>
+        <a:font script="Sinh" typeface="Iskoola Pota"/>
+        <a:font script="Mong" typeface="Mongolian Baiti"/>
+        <a:font script="Viet" typeface="Arial"/>
+        <a:font script="Uigh" typeface="Microsoft Uighur"/>
+        <a:font script="Geor" typeface="Sylfaen"/>
+      </a:minorFont>
+    </a:fontScheme>
+    <a:fmtScheme name="Office">
+      <a:fillStyleLst>
+        <a:solidFill>
+          <a:schemeClr val="phClr"/>
+        </a:solidFill>
+        <a:gradFill rotWithShape="1">
+          <a:gsLst>
+            <a:gs pos="0">
+              <a:schemeClr val="phClr">
+                <a:lumMod val="110000"/>
+                <a:satMod val="105000"/>
+                <a:tint val="67000"/>
+              </a:schemeClr>
+            </a:gs>
+            <a:gs pos="50000">
+              <a:schemeClr val="phClr">
+                <a:lumMod val="105000"/>
+                <a:satMod val="103000"/>
+                <a:tint val="73000"/>
+              </a:schemeClr>
+            </a:gs>
+            <a:gs pos="100000">
+              <a:schemeClr val="phClr">
+                <a:lumMod val="105000"/>
+                <a:satMod val="109000"/>
+                <a:tint val="81000"/>
+              </a:schemeClr>
+            </a:gs>
+          </a:gsLst>
+          <a:lin ang="5400000" scaled="0"/>
+        </a:gradFill>
+        <a:gradFill rotWithShape="1">
+          <a:gsLst>
+            <a:gs pos="0">
+              <a:schemeClr val="phClr">
+                <a:satMod val="103000"/>
+                <a:lumMod val="102000"/>
+                <a:tint val="94000"/>
+              </a:schemeClr>
+            </a:gs>
+            <a:gs pos="50000">
+              <a:schemeClr val="phClr">
+                <a:satMod val="110000"/>
+                <a:lumMod val="100000"/>
+                <a:shade val="100000"/>
+              </a:schemeClr>
+            </a:gs>
+            <a:gs pos="100000">
+              <a:schemeClr val="phClr">
+                <a:lumMod val="99000"/>
+                <a:satMod val="120000"/>
+                <a:shade val="78000"/>
+              </a:schemeClr>
+            </a:gs>
+          </a:gsLst>
+          <a:lin ang="5400000" scaled="0"/>
+        </a:gradFill>
+      </a:fillStyleLst>
+      <a:lnStyleLst>
+        <a:ln w="6350" cap="flat" cmpd="sng" algn="ctr">
+          <a:solidFill>
+            <a:schemeClr val="phClr"/>
+          </a:solidFill>
+          <a:prstDash val="solid"/>
+          <a:miter lim="800000"/>
+        </a:ln>
+        <a:ln w="12700" cap="flat" cmpd="sng" algn="ctr">
+          <a:solidFill>
+            <a:schemeClr val="phClr"/>
+          </a:solidFill>
+          <a:prstDash val="solid"/>
+          <a:miter lim="800000"/>
+        </a:ln>
+        <a:ln w="19050" cap="flat" cmpd="sng" algn="ctr">
+          <a:solidFill>
+            <a:schemeClr val="phClr"/>
+          </a:solidFill>
+          <a:prstDash val="solid"/>
+          <a:miter lim="800000"/>
+        </a:ln>
+      </a:lnStyleLst>
+      <a:effectStyleLst>
+        <a:effectStyle>
+          <a:effectLst/>
+        </a:effectStyle>
+        <a:effectStyle>
+          <a:effectLst/>
+        </a:effectStyle>
+        <a:effectStyle>
+          <a:effectLst>
+            <a:outerShdw blurRad="57150" dist="19050" dir="5400000" algn="ctr" rotWithShape="0">
+              <a:srgbClr val="000000">
+                <a:alpha val="63000"/>
+              </a:srgbClr>
+            </a:outerShdw>
+          </a:effectLst>
+        </a:effectStyle>
+      </a:effectStyleLst>
+      <a:bgFillStyleLst>
+        <a:solidFill>
+          <a:schemeClr val="phClr"/>
+        </a:solidFill>
+        <a:solidFill>
+          <a:schemeClr val="phClr">
+            <a:tint val="95000"/>
+            <a:satMod val="170000"/>
+          </a:schemeClr>
+        </a:solidFill>
+        <a:gradFill rotWithShape="1">
+          <a:gsLst>
+            <a:gs pos="0">
+              <a:schemeClr val="phClr">
+                <a:tint val="93000"/>
+                <a:satMod val="150000"/>
+                <a:shade val="98000"/>
+                <a:lumMod val="102000"/>
+              </a:schemeClr>
+            </a:gs>
+            <a:gs pos="50000">
+              <a:schemeClr val="phClr">
+                <a:tint val="98000"/>
+                <a:satMod val="130000"/>
+                <a:shade val="90000"/>
+                <a:lumMod val="103000"/>
+              </a:schemeClr>
+            </a:gs>
+            <a:gs pos="100000">
+              <a:schemeClr val="phClr">
+                <a:shade val="63000"/>
+                <a:satMod val="120000"/>
+              </a:schemeClr>
+            </a:gs>
+          </a:gsLst>
+          <a:lin ang="5400000" scaled="0"/>
+        </a:gradFill>
+      </a:bgFillStyleLst>
+    </a:fmtScheme>
+  </a:themeElements>
+  <a:objectDefaults/>
+  <a:extraClrSchemeLst/>
+  <a:extLst>
+    <a:ext uri="{05A4C25C-085E-4340-85A3-A5531E510DB2}">
+      <thm15:themeFamily xmlns:thm15="http://schemas.microsoft.com/office/thememl/2012/main" name="Office Theme" id="{62F939B6-93AF-4DB8-9C6B-D6C7DFDC589F}" vid="{4A3C46E8-61CC-4603-A589-7422A47A8E4A}"/>
+    </a:ext>
+  </a:extLst>
+</a:theme>
 </file>
</xml_diff>